<commit_message>
completed add example code in week01~week02
</commit_message>
<xml_diff>
--- a/Week02/Swift for UIKit.pptx
+++ b/Week02/Swift for UIKit.pptx
@@ -5756,7 +5756,7 @@
                   <a:srgbClr val="FC6BAA"/>
                 </a:solidFill>
               </a:rPr>
-              <a:t>@IBActionfunc</a:t>
+              <a:t>@IBAction func </a:t>
             </a:r>
             <a:r>
               <a:rPr lang="en-US" altLang="zh-CN" sz="1800">
@@ -7175,7 +7175,7 @@
               <a:t>func</a:t>
             </a:r>
             <a:r>
-              <a:rPr lang="" altLang="en-US" sz="1800">
+              <a:rPr lang="en-US" altLang="en-US" sz="1800">
                 <a:solidFill>
                   <a:srgbClr val="FC6BAA"/>
                 </a:solidFill>
@@ -7199,7 +7199,7 @@
               <a:t>(</a:t>
             </a:r>
             <a:r>
-              <a:rPr lang="" altLang="en-US" sz="1800">
+              <a:rPr lang="en-US" altLang="en-US" sz="1800">
                 <a:solidFill>
                   <a:srgbClr val="FFFFFF"/>
                 </a:solidFill>
@@ -7334,7 +7334,7 @@
               <a:t>(</a:t>
             </a:r>
             <a:r>
-              <a:rPr lang="" altLang="en-US" sz="1800">
+              <a:rPr lang="en-US" altLang="en-US" sz="1800">
                 <a:solidFill>
                   <a:srgbClr val="FFFFFF"/>
                 </a:solidFill>
@@ -7605,7 +7605,7 @@
               <a:t>func</a:t>
             </a:r>
             <a:r>
-              <a:rPr lang="" altLang="en-US" sz="1800">
+              <a:rPr lang="en-US" altLang="en-US" sz="1800">
                 <a:solidFill>
                   <a:srgbClr val="FC6BAA"/>
                 </a:solidFill>
@@ -7851,7 +7851,7 @@
               <a:t>func</a:t>
             </a:r>
             <a:r>
-              <a:rPr lang="" altLang="en-US" sz="1800">
+              <a:rPr lang="en-US" altLang="en-US" sz="1800">
                 <a:solidFill>
                   <a:srgbClr val="FC6BAA"/>
                 </a:solidFill>
@@ -8376,7 +8376,7 @@
               <a:t>var</a:t>
             </a:r>
             <a:r>
-              <a:rPr lang="" altLang="en-US" sz="1800">
+              <a:rPr lang="en-US" altLang="en-US" sz="1800">
                 <a:solidFill>
                   <a:srgbClr val="FC6BAA"/>
                 </a:solidFill>
@@ -8800,7 +8800,7 @@
               <a:t>var</a:t>
             </a:r>
             <a:r>
-              <a:rPr lang="" altLang="en-US" sz="1800">
+              <a:rPr lang="en-US" altLang="en-US" sz="1800">
                 <a:solidFill>
                   <a:srgbClr val="FC6BAA"/>
                 </a:solidFill>
@@ -8865,7 +8865,7 @@
                   <a:srgbClr val="FC6BAA"/>
                 </a:solidFill>
               </a:rPr>
-              <a:t>iflet</a:t>
+              <a:t>if let</a:t>
             </a:r>
             <a:r>
               <a:rPr lang="en-US" altLang="zh-CN" sz="1800">
@@ -10261,7 +10261,24 @@
                   <a:srgbClr val="7CB554"/>
                 </a:solidFill>
               </a:rPr>
-              <a:t>// "John Appleseed" (Force-unwrap - careful!)</a:t>
+              <a:t>// "</a:t>
+            </a:r>
+            <a:r>
+              <a:rPr lang="en-US" altLang="zh-CN" sz="1800">
+                <a:solidFill>
+                  <a:srgbClr val="7CB554"/>
+                </a:solidFill>
+                <a:sym typeface="+mn-ea"/>
+              </a:rPr>
+              <a:t>Nem Sothea</a:t>
+            </a:r>
+            <a:r>
+              <a:rPr lang="en-US" altLang="zh-CN" sz="1800">
+                <a:solidFill>
+                  <a:srgbClr val="7CB554"/>
+                </a:solidFill>
+              </a:rPr>
+              <a:t>" (Force-unwrap - careful!)</a:t>
             </a:r>
             <a:endParaRPr lang="en-US" altLang="zh-CN" sz="1800">
               <a:solidFill>

</xml_diff>